<commit_message>
Updated as sent to PCE-chairs
</commit_message>
<xml_diff>
--- a/Stateful H-PCE and ACTN IETF 98.pptx
+++ b/Stateful H-PCE and ACTN IETF 98.pptx
@@ -3593,19 +3593,7 @@
         <a:p>
           <a:r>
             <a:rPr lang="en-US" altLang="zh-CN" dirty="0" smtClean="0"/>
-            <a:t>MDSC oversees different domains and build an E2E </a:t>
-          </a:r>
-          <a:r>
-            <a:rPr lang="en-US" altLang="zh-CN" dirty="0" smtClean="0"/>
-            <a:t>abstracted topology </a:t>
-          </a:r>
-          <a:r>
-            <a:rPr lang="en-US" altLang="zh-CN" dirty="0" smtClean="0"/>
-            <a:t>and coordinate E2E </a:t>
-          </a:r>
-          <a:r>
-            <a:rPr lang="en-US" altLang="zh-CN" dirty="0" smtClean="0"/>
-            <a:t>path/service provisioning.</a:t>
+            <a:t>MDSC oversees different domains and build an E2E abstracted topology and coordinate E2E path/service provisioning.</a:t>
           </a:r>
           <a:endParaRPr lang="zh-CN" altLang="en-US" dirty="0"/>
         </a:p>
@@ -3642,23 +3630,7 @@
         <a:p>
           <a:r>
             <a:rPr lang="en-US" altLang="zh-CN" dirty="0" smtClean="0"/>
-            <a:t>An abstracted </a:t>
-          </a:r>
-          <a:r>
-            <a:rPr lang="en-US" altLang="zh-CN" dirty="0" smtClean="0"/>
-            <a:t>view of underlying network </a:t>
-          </a:r>
-          <a:r>
-            <a:rPr lang="en-US" altLang="zh-CN" dirty="0" smtClean="0"/>
-            <a:t>resources of </a:t>
-          </a:r>
-          <a:r>
-            <a:rPr lang="en-US" altLang="zh-CN" dirty="0" smtClean="0"/>
-            <a:t>each </a:t>
-          </a:r>
-          <a:r>
-            <a:rPr lang="en-US" altLang="zh-CN" dirty="0" smtClean="0"/>
-            <a:t>domain to form an E2E network topology.</a:t>
+            <a:t>An abstracted view of underlying network resources of each domain to form an E2E network topology.</a:t>
           </a:r>
           <a:endParaRPr lang="zh-CN" altLang="en-US" dirty="0"/>
         </a:p>
@@ -3695,11 +3667,7 @@
         <a:p>
           <a:r>
             <a:rPr lang="en-IN" altLang="en-US" dirty="0" smtClean="0"/>
-            <a:t>Customer </a:t>
-          </a:r>
-          <a:r>
-            <a:rPr lang="en-IN" altLang="en-US" dirty="0" smtClean="0"/>
-            <a:t>mapping/</a:t>
+            <a:t>Customer mapping/</a:t>
           </a:r>
           <a:r>
             <a:rPr lang="en-US" dirty="0" smtClean="0"/>
@@ -3740,11 +3708,7 @@
         <a:p>
           <a:r>
             <a:rPr lang="en-US" altLang="zh-CN" dirty="0" smtClean="0"/>
-            <a:t>Map customer VN requirements into network provisioning </a:t>
-          </a:r>
-          <a:r>
-            <a:rPr lang="en-US" altLang="zh-CN" dirty="0" smtClean="0"/>
-            <a:t>requests that are serviced by the PNC</a:t>
+            <a:t>Map customer VN requirements into network provisioning requests that are serviced by the PNC</a:t>
           </a:r>
           <a:endParaRPr lang="zh-CN" altLang="en-US" dirty="0"/>
         </a:p>
@@ -3892,11 +3856,7 @@
         <a:p>
           <a:r>
             <a:rPr lang="en-US" altLang="zh-CN" dirty="0" smtClean="0"/>
-            <a:t>Includes customer’s </a:t>
-          </a:r>
-          <a:r>
-            <a:rPr lang="en-US" altLang="zh-CN" dirty="0" smtClean="0"/>
-            <a:t>view of network slice</a:t>
+            <a:t>Includes customer’s view of network slice</a:t>
           </a:r>
           <a:endParaRPr lang="zh-CN" altLang="en-US" dirty="0"/>
         </a:p>
@@ -4232,8 +4192,8 @@
     </dgm:pt>
   </dgm:ptLst>
   <dgm:cxnLst>
+    <dgm:cxn modelId="{7AD14B95-9721-49CF-8F31-B8F76F1F71D0}" type="presOf" srcId="{943183F0-381F-4A0A-8F8D-2241D3200ED4}" destId="{7E397374-082B-4279-BCD4-C284F78E8712}" srcOrd="1" destOrd="0" presId="urn:microsoft.com/office/officeart/2005/8/layout/list1"/>
     <dgm:cxn modelId="{FB91B81D-C5F3-418B-8327-5A9B00FAAFAD}" srcId="{880C5722-62C6-4A4E-B645-3846D5895E23}" destId="{943183F0-381F-4A0A-8F8D-2241D3200ED4}" srcOrd="3" destOrd="0" parTransId="{2B9DF7E5-D04F-4CDF-B130-DC02F3F49C0A}" sibTransId="{601B5BD6-F1D1-490F-A998-9021E935D007}"/>
-    <dgm:cxn modelId="{7AD14B95-9721-49CF-8F31-B8F76F1F71D0}" type="presOf" srcId="{943183F0-381F-4A0A-8F8D-2241D3200ED4}" destId="{7E397374-082B-4279-BCD4-C284F78E8712}" srcOrd="1" destOrd="0" presId="urn:microsoft.com/office/officeart/2005/8/layout/list1"/>
     <dgm:cxn modelId="{6AAEADA6-31F9-44CB-9543-899859BDDCE9}" type="presOf" srcId="{45AB654C-31B4-4ED7-908C-05CC0CDD366C}" destId="{C4C6F28B-FBD3-420F-B986-7EEE24D08FE5}" srcOrd="1" destOrd="0" presId="urn:microsoft.com/office/officeart/2005/8/layout/list1"/>
     <dgm:cxn modelId="{BD01BCCD-F440-4E5F-A294-1F1E07E9F63D}" srcId="{D9B8E6D6-65A5-4B12-9783-662CC85CD4CB}" destId="{CBFD38F6-F914-41FD-8D82-E54677AE82C5}" srcOrd="0" destOrd="0" parTransId="{3593681E-BAA7-4EE3-B89B-E8C968206061}" sibTransId="{3EBBA6F7-A6C3-4C40-A59B-A16D04FCE3A2}"/>
     <dgm:cxn modelId="{ED9B96E4-5BD0-4C1E-9ADA-B175485872DC}" type="presOf" srcId="{943183F0-381F-4A0A-8F8D-2241D3200ED4}" destId="{67DDA0E8-966F-432A-923A-03225F4DA97F}" srcOrd="0" destOrd="0" presId="urn:microsoft.com/office/officeart/2005/8/layout/list1"/>
@@ -4907,22 +4867,22 @@
   </dgm:ptLst>
   <dgm:cxnLst>
     <dgm:cxn modelId="{DF52A647-79E1-4CC1-9041-18147527508C}" srcId="{3904E1CC-60D4-4010-80ED-D23F3E90C0D3}" destId="{F0727973-DEA9-47EB-A4DE-2E4CC9213763}" srcOrd="2" destOrd="0" parTransId="{4B0FB2FD-3DA0-4C5A-A0BD-BECBE0F67BF0}" sibTransId="{9E8A37CC-050F-47E1-A31E-5DF862ACA8BA}"/>
+    <dgm:cxn modelId="{51C7EB45-CDAA-4DA2-855D-842D7A3B1AED}" type="presOf" srcId="{A4BF661D-8D69-42E3-9311-70FA51EF5CB6}" destId="{C999E3BE-AB51-4BE7-A1BD-22B6EEBF09CC}" srcOrd="0" destOrd="0" presId="urn:microsoft.com/office/officeart/2005/8/layout/vList5"/>
     <dgm:cxn modelId="{A6BE62D2-2E65-4536-AE81-CCB26999AF84}" type="presOf" srcId="{E0A47ECE-F4F7-4E82-8E03-0CD40A2233F3}" destId="{29757E4B-28CB-4C02-8281-853EC1773959}" srcOrd="0" destOrd="0" presId="urn:microsoft.com/office/officeart/2005/8/layout/vList5"/>
-    <dgm:cxn modelId="{51C7EB45-CDAA-4DA2-855D-842D7A3B1AED}" type="presOf" srcId="{A4BF661D-8D69-42E3-9311-70FA51EF5CB6}" destId="{C999E3BE-AB51-4BE7-A1BD-22B6EEBF09CC}" srcOrd="0" destOrd="0" presId="urn:microsoft.com/office/officeart/2005/8/layout/vList5"/>
     <dgm:cxn modelId="{6C33FCB6-D2D9-457B-8E4E-4DEEC17CD81F}" srcId="{3904E1CC-60D4-4010-80ED-D23F3E90C0D3}" destId="{E0A47ECE-F4F7-4E82-8E03-0CD40A2233F3}" srcOrd="0" destOrd="0" parTransId="{E65ACF07-6C17-47CB-A59B-C991446B7F11}" sibTransId="{EDB45C22-025E-48B8-91E1-7D65FD124DBD}"/>
     <dgm:cxn modelId="{AAD783FD-E0F8-47CE-93D8-AF3360C44495}" type="presOf" srcId="{75C0D867-5769-4467-871A-BFC932E787E8}" destId="{7226C51C-DC8B-4560-A153-FD3DE006DEB6}" srcOrd="0" destOrd="0" presId="urn:microsoft.com/office/officeart/2005/8/layout/vList5"/>
     <dgm:cxn modelId="{798CE25D-492E-4748-B44F-1BC5F98B4955}" srcId="{E0A47ECE-F4F7-4E82-8E03-0CD40A2233F3}" destId="{64F897BD-7B0F-4730-9D77-5D9938FE509F}" srcOrd="1" destOrd="0" parTransId="{95B3DF65-E539-4620-86DC-2E678242FE47}" sibTransId="{768E73F3-92C7-4C39-AE3B-2306E3F4C9E4}"/>
     <dgm:cxn modelId="{B953A472-0136-4EA0-BE57-9182835F9CA5}" srcId="{3904E1CC-60D4-4010-80ED-D23F3E90C0D3}" destId="{B8206814-FF8F-460D-B495-C882F72EE725}" srcOrd="1" destOrd="0" parTransId="{B9155113-9C08-47F0-98C2-3503715E8D65}" sibTransId="{BA65B5EF-4814-4EB6-B80B-B3FCDD268582}"/>
     <dgm:cxn modelId="{A4107A5D-F603-436F-995E-5B7EE47EB4F2}" type="presOf" srcId="{F0727973-DEA9-47EB-A4DE-2E4CC9213763}" destId="{1287B3D5-445E-4C5D-A0C2-F66E67BF5A85}" srcOrd="0" destOrd="0" presId="urn:microsoft.com/office/officeart/2005/8/layout/vList5"/>
     <dgm:cxn modelId="{1F98644D-99D9-416A-8297-233FAAEBD1C0}" type="presOf" srcId="{3904E1CC-60D4-4010-80ED-D23F3E90C0D3}" destId="{D53F524F-A4BD-4626-9FA5-77E8390C28AD}" srcOrd="0" destOrd="0" presId="urn:microsoft.com/office/officeart/2005/8/layout/vList5"/>
-    <dgm:cxn modelId="{D0D6E1D8-157E-44AA-80BA-438EEB973A2C}" srcId="{B8206814-FF8F-460D-B495-C882F72EE725}" destId="{049064DC-E3DA-48B8-87C0-CB56FFF7C491}" srcOrd="0" destOrd="0" parTransId="{F5DE38C7-6DC4-463D-9AC9-3B8D71B3E131}" sibTransId="{8FF48080-36F8-4508-BDFF-295C470FDB48}"/>
     <dgm:cxn modelId="{79E220A1-A078-4064-8200-4A79BC7BF4AD}" type="presOf" srcId="{049064DC-E3DA-48B8-87C0-CB56FFF7C491}" destId="{68261E6C-FAAA-4C96-A953-E7EBA5FC4DFC}" srcOrd="0" destOrd="0" presId="urn:microsoft.com/office/officeart/2005/8/layout/vList5"/>
     <dgm:cxn modelId="{BFA3D1A6-5B2A-4E39-A991-28F72C6A74D1}" srcId="{E0A47ECE-F4F7-4E82-8E03-0CD40A2233F3}" destId="{75C0D867-5769-4467-871A-BFC932E787E8}" srcOrd="0" destOrd="0" parTransId="{F1AB6B00-CA09-42C7-BBF9-F46C52C471DE}" sibTransId="{B25D0F08-DF7B-4448-A000-54577F9A332C}"/>
     <dgm:cxn modelId="{FAC232C4-E1D6-46CF-BBC9-9C99FD782E94}" srcId="{F0727973-DEA9-47EB-A4DE-2E4CC9213763}" destId="{A4BF661D-8D69-42E3-9311-70FA51EF5CB6}" srcOrd="0" destOrd="0" parTransId="{663808DE-F5B8-4A42-AEA2-0BF5F8C70FBC}" sibTransId="{AB6DA927-3C1D-4F4C-A60F-5A4EB565320F}"/>
+    <dgm:cxn modelId="{D0D6E1D8-157E-44AA-80BA-438EEB973A2C}" srcId="{B8206814-FF8F-460D-B495-C882F72EE725}" destId="{049064DC-E3DA-48B8-87C0-CB56FFF7C491}" srcOrd="0" destOrd="0" parTransId="{F5DE38C7-6DC4-463D-9AC9-3B8D71B3E131}" sibTransId="{8FF48080-36F8-4508-BDFF-295C470FDB48}"/>
+    <dgm:cxn modelId="{BC184AD7-95DC-423A-A598-347B172642DC}" type="presOf" srcId="{5D2DAFDC-4D76-4024-893E-AAA9421D3F64}" destId="{68261E6C-FAAA-4C96-A953-E7EBA5FC4DFC}" srcOrd="0" destOrd="1" presId="urn:microsoft.com/office/officeart/2005/8/layout/vList5"/>
+    <dgm:cxn modelId="{6C01AB77-4F54-4C4E-B799-DD0F71AFF898}" type="presOf" srcId="{1CBB5D73-ABDC-444C-BDAC-603375C6E718}" destId="{7226C51C-DC8B-4560-A153-FD3DE006DEB6}" srcOrd="0" destOrd="2" presId="urn:microsoft.com/office/officeart/2005/8/layout/vList5"/>
+    <dgm:cxn modelId="{940E6953-1427-4215-93A4-14AA39235569}" type="presOf" srcId="{B8206814-FF8F-460D-B495-C882F72EE725}" destId="{8351BA44-B7E3-436A-95AD-427CF97C7656}" srcOrd="0" destOrd="0" presId="urn:microsoft.com/office/officeart/2005/8/layout/vList5"/>
     <dgm:cxn modelId="{5B7C0FA8-3820-4072-8810-0DC23046B28E}" type="presOf" srcId="{64F897BD-7B0F-4730-9D77-5D9938FE509F}" destId="{7226C51C-DC8B-4560-A153-FD3DE006DEB6}" srcOrd="0" destOrd="1" presId="urn:microsoft.com/office/officeart/2005/8/layout/vList5"/>
-    <dgm:cxn modelId="{BC184AD7-95DC-423A-A598-347B172642DC}" type="presOf" srcId="{5D2DAFDC-4D76-4024-893E-AAA9421D3F64}" destId="{68261E6C-FAAA-4C96-A953-E7EBA5FC4DFC}" srcOrd="0" destOrd="1" presId="urn:microsoft.com/office/officeart/2005/8/layout/vList5"/>
-    <dgm:cxn modelId="{940E6953-1427-4215-93A4-14AA39235569}" type="presOf" srcId="{B8206814-FF8F-460D-B495-C882F72EE725}" destId="{8351BA44-B7E3-436A-95AD-427CF97C7656}" srcOrd="0" destOrd="0" presId="urn:microsoft.com/office/officeart/2005/8/layout/vList5"/>
-    <dgm:cxn modelId="{6C01AB77-4F54-4C4E-B799-DD0F71AFF898}" type="presOf" srcId="{1CBB5D73-ABDC-444C-BDAC-603375C6E718}" destId="{7226C51C-DC8B-4560-A153-FD3DE006DEB6}" srcOrd="0" destOrd="2" presId="urn:microsoft.com/office/officeart/2005/8/layout/vList5"/>
     <dgm:cxn modelId="{25A67270-E224-4436-A343-0DD4813DB563}" srcId="{B8206814-FF8F-460D-B495-C882F72EE725}" destId="{5D2DAFDC-4D76-4024-893E-AAA9421D3F64}" srcOrd="1" destOrd="0" parTransId="{2A436701-9AFB-41DA-BB88-9EE246B2F5B5}" sibTransId="{A750794B-A731-4EA8-886A-D82193645FD1}"/>
     <dgm:cxn modelId="{9E570514-8E04-42BD-8133-ED03D7D06667}" srcId="{E0A47ECE-F4F7-4E82-8E03-0CD40A2233F3}" destId="{1CBB5D73-ABDC-444C-BDAC-603375C6E718}" srcOrd="2" destOrd="0" parTransId="{58CB8477-E48A-4DE1-8D97-2AF6D59BF948}" sibTransId="{BE1C6FEB-001D-4812-BC4A-BA686274F9EC}"/>
     <dgm:cxn modelId="{279BE782-76BE-4B00-B46E-5096277F5A69}" type="presParOf" srcId="{D53F524F-A4BD-4626-9FA5-77E8390C28AD}" destId="{09015CEA-EE7C-48BB-8DA2-7E449F6D28F7}" srcOrd="0" destOrd="0" presId="urn:microsoft.com/office/officeart/2005/8/layout/vList5"/>
@@ -5194,6 +5154,13 @@
         </dgm:presLayoutVars>
       </dgm:prSet>
       <dgm:spPr/>
+      <dgm:t>
+        <a:bodyPr/>
+        <a:lstStyle/>
+        <a:p>
+          <a:endParaRPr lang="en-US"/>
+        </a:p>
+      </dgm:t>
     </dgm:pt>
     <dgm:pt modelId="{0B7D2B0D-E7E6-4015-8C56-ACB4206D4F0D}" type="pres">
       <dgm:prSet presAssocID="{09BE69F0-63E8-436C-94B1-5F29B7439214}" presName="root" presStyleCnt="0"/>
@@ -5217,6 +5184,13 @@
     <dgm:pt modelId="{42048D09-F950-448B-81E5-081B2F07F58F}" type="pres">
       <dgm:prSet presAssocID="{09BE69F0-63E8-436C-94B1-5F29B7439214}" presName="rootConnector" presStyleLbl="node1" presStyleIdx="0" presStyleCnt="2"/>
       <dgm:spPr/>
+      <dgm:t>
+        <a:bodyPr/>
+        <a:lstStyle/>
+        <a:p>
+          <a:endParaRPr lang="en-US"/>
+        </a:p>
+      </dgm:t>
     </dgm:pt>
     <dgm:pt modelId="{BE570CD8-4352-4503-989E-63BEF500347C}" type="pres">
       <dgm:prSet presAssocID="{09BE69F0-63E8-436C-94B1-5F29B7439214}" presName="childShape" presStyleCnt="0"/>
@@ -5225,6 +5199,13 @@
     <dgm:pt modelId="{FA1AA88D-1E99-4643-B9CC-5B86CA0E936E}" type="pres">
       <dgm:prSet presAssocID="{89F12062-8995-49E1-B073-A7749A5D7FE6}" presName="Name13" presStyleLbl="parChTrans1D2" presStyleIdx="0" presStyleCnt="4"/>
       <dgm:spPr/>
+      <dgm:t>
+        <a:bodyPr/>
+        <a:lstStyle/>
+        <a:p>
+          <a:endParaRPr lang="en-US"/>
+        </a:p>
+      </dgm:t>
     </dgm:pt>
     <dgm:pt modelId="{4C6995FB-3B5C-4CFD-B30F-26EC9CBDEDF5}" type="pres">
       <dgm:prSet presAssocID="{AA8588DC-7C82-4C7B-956C-B80D6D91B235}" presName="childText" presStyleLbl="bgAcc1" presStyleIdx="0" presStyleCnt="4">
@@ -5233,10 +5214,24 @@
         </dgm:presLayoutVars>
       </dgm:prSet>
       <dgm:spPr/>
+      <dgm:t>
+        <a:bodyPr/>
+        <a:lstStyle/>
+        <a:p>
+          <a:endParaRPr lang="en-US"/>
+        </a:p>
+      </dgm:t>
     </dgm:pt>
     <dgm:pt modelId="{8DC43395-48E3-440E-B7A7-1CD58AB02084}" type="pres">
       <dgm:prSet presAssocID="{AB162E74-CDB8-4D91-9474-72A914914EAA}" presName="Name13" presStyleLbl="parChTrans1D2" presStyleIdx="1" presStyleCnt="4"/>
       <dgm:spPr/>
+      <dgm:t>
+        <a:bodyPr/>
+        <a:lstStyle/>
+        <a:p>
+          <a:endParaRPr lang="en-US"/>
+        </a:p>
+      </dgm:t>
     </dgm:pt>
     <dgm:pt modelId="{8858494B-1D5B-40C2-A69D-579891C802A1}" type="pres">
       <dgm:prSet presAssocID="{D8F8F6F4-4756-43A6-BE9A-AD47A5A5F04C}" presName="childText" presStyleLbl="bgAcc1" presStyleIdx="1" presStyleCnt="4">
@@ -5245,6 +5240,13 @@
         </dgm:presLayoutVars>
       </dgm:prSet>
       <dgm:spPr/>
+      <dgm:t>
+        <a:bodyPr/>
+        <a:lstStyle/>
+        <a:p>
+          <a:endParaRPr lang="en-US"/>
+        </a:p>
+      </dgm:t>
     </dgm:pt>
     <dgm:pt modelId="{BBCDA755-6C91-49BB-BEDC-81430A79016E}" type="pres">
       <dgm:prSet presAssocID="{D308FA02-4FDD-461F-AB9B-5FF73C8B3E89}" presName="root" presStyleCnt="0"/>
@@ -5268,6 +5270,13 @@
     <dgm:pt modelId="{F13916FB-5E14-48FA-8D68-C8EF7905E7A0}" type="pres">
       <dgm:prSet presAssocID="{D308FA02-4FDD-461F-AB9B-5FF73C8B3E89}" presName="rootConnector" presStyleLbl="node1" presStyleIdx="1" presStyleCnt="2"/>
       <dgm:spPr/>
+      <dgm:t>
+        <a:bodyPr/>
+        <a:lstStyle/>
+        <a:p>
+          <a:endParaRPr lang="en-US"/>
+        </a:p>
+      </dgm:t>
     </dgm:pt>
     <dgm:pt modelId="{3FB0638C-820F-46A4-BF56-5385450C6FEB}" type="pres">
       <dgm:prSet presAssocID="{D308FA02-4FDD-461F-AB9B-5FF73C8B3E89}" presName="childShape" presStyleCnt="0"/>
@@ -5276,6 +5285,13 @@
     <dgm:pt modelId="{43E97C37-45F5-4EB8-8188-E943F3F4DBD4}" type="pres">
       <dgm:prSet presAssocID="{0D22B8AA-BE7D-4A32-85C5-DE0FCA76A402}" presName="Name13" presStyleLbl="parChTrans1D2" presStyleIdx="2" presStyleCnt="4"/>
       <dgm:spPr/>
+      <dgm:t>
+        <a:bodyPr/>
+        <a:lstStyle/>
+        <a:p>
+          <a:endParaRPr lang="en-US"/>
+        </a:p>
+      </dgm:t>
     </dgm:pt>
     <dgm:pt modelId="{A236BC26-9B1B-4DAF-A470-171D5BDF0CC6}" type="pres">
       <dgm:prSet presAssocID="{8A071D78-A677-4423-BDEF-9DBFA8F57178}" presName="childText" presStyleLbl="bgAcc1" presStyleIdx="2" presStyleCnt="4">
@@ -5295,6 +5311,13 @@
     <dgm:pt modelId="{9180388F-F392-4C3A-A905-40BB22853C2C}" type="pres">
       <dgm:prSet presAssocID="{CCEDF5F6-7666-4611-9C02-F34F2B7DE89D}" presName="Name13" presStyleLbl="parChTrans1D2" presStyleIdx="3" presStyleCnt="4"/>
       <dgm:spPr/>
+      <dgm:t>
+        <a:bodyPr/>
+        <a:lstStyle/>
+        <a:p>
+          <a:endParaRPr lang="en-US"/>
+        </a:p>
+      </dgm:t>
     </dgm:pt>
     <dgm:pt modelId="{64A5FC7E-98B7-4B33-8C8C-8A87629499ED}" type="pres">
       <dgm:prSet presAssocID="{615FD802-E02F-442A-AA98-124696F1E04F}" presName="childText" presStyleLbl="bgAcc1" presStyleIdx="3" presStyleCnt="4">
@@ -5318,8 +5341,8 @@
     <dgm:cxn modelId="{ADC04AD1-992F-4277-AD8D-09C819693A96}" type="presOf" srcId="{CCEDF5F6-7666-4611-9C02-F34F2B7DE89D}" destId="{9180388F-F392-4C3A-A905-40BB22853C2C}" srcOrd="0" destOrd="0" presId="urn:microsoft.com/office/officeart/2005/8/layout/hierarchy3"/>
     <dgm:cxn modelId="{0633BEE7-FDAB-4ABD-AA22-4710D3A75E4D}" srcId="{D308FA02-4FDD-461F-AB9B-5FF73C8B3E89}" destId="{8A071D78-A677-4423-BDEF-9DBFA8F57178}" srcOrd="0" destOrd="0" parTransId="{0D22B8AA-BE7D-4A32-85C5-DE0FCA76A402}" sibTransId="{573CEA18-CD27-4FA7-A262-AABFD641476C}"/>
     <dgm:cxn modelId="{81171124-E05E-472A-BC1E-E777A12EC133}" srcId="{09BE69F0-63E8-436C-94B1-5F29B7439214}" destId="{AA8588DC-7C82-4C7B-956C-B80D6D91B235}" srcOrd="0" destOrd="0" parTransId="{89F12062-8995-49E1-B073-A7749A5D7FE6}" sibTransId="{2C819DCE-33E6-4B0B-963D-3519E4AAF334}"/>
+    <dgm:cxn modelId="{1BCE9FF5-10F3-459B-8434-18A80FDCBE58}" type="presOf" srcId="{D308FA02-4FDD-461F-AB9B-5FF73C8B3E89}" destId="{F13916FB-5E14-48FA-8D68-C8EF7905E7A0}" srcOrd="1" destOrd="0" presId="urn:microsoft.com/office/officeart/2005/8/layout/hierarchy3"/>
     <dgm:cxn modelId="{D87D6926-47F4-42BF-91E7-ADEB244D1202}" type="presOf" srcId="{615FD802-E02F-442A-AA98-124696F1E04F}" destId="{64A5FC7E-98B7-4B33-8C8C-8A87629499ED}" srcOrd="0" destOrd="0" presId="urn:microsoft.com/office/officeart/2005/8/layout/hierarchy3"/>
-    <dgm:cxn modelId="{1BCE9FF5-10F3-459B-8434-18A80FDCBE58}" type="presOf" srcId="{D308FA02-4FDD-461F-AB9B-5FF73C8B3E89}" destId="{F13916FB-5E14-48FA-8D68-C8EF7905E7A0}" srcOrd="1" destOrd="0" presId="urn:microsoft.com/office/officeart/2005/8/layout/hierarchy3"/>
     <dgm:cxn modelId="{F3089628-CCFE-48D5-B4AF-B88CDB3C7950}" type="presOf" srcId="{D8F8F6F4-4756-43A6-BE9A-AD47A5A5F04C}" destId="{8858494B-1D5B-40C2-A69D-579891C802A1}" srcOrd="0" destOrd="0" presId="urn:microsoft.com/office/officeart/2005/8/layout/hierarchy3"/>
     <dgm:cxn modelId="{4C8A534C-DE2D-4FE9-A14B-33B67C4ACCBB}" type="presOf" srcId="{D308FA02-4FDD-461F-AB9B-5FF73C8B3E89}" destId="{E6A04BA1-D59F-46E0-B440-753E93F01296}" srcOrd="0" destOrd="0" presId="urn:microsoft.com/office/officeart/2005/8/layout/hierarchy3"/>
     <dgm:cxn modelId="{D7C01A81-500E-4682-BC5E-F8D0A79B061A}" type="presOf" srcId="{AB162E74-CDB8-4D91-9474-72A914914EAA}" destId="{8DC43395-48E3-440E-B7A7-1CD58AB02084}" srcOrd="0" destOrd="0" presId="urn:microsoft.com/office/officeart/2005/8/layout/hierarchy3"/>
@@ -5421,7 +5444,11 @@
         <a:p>
           <a:r>
             <a:rPr lang="en-US" dirty="0" smtClean="0"/>
-            <a:t>Implementation reports for some, shared on the list.  </a:t>
+            <a:t>Implementation reports for some, shared on the list</a:t>
+          </a:r>
+          <a:r>
+            <a:rPr lang="en-US" dirty="0" smtClean="0"/>
+            <a:t>.</a:t>
           </a:r>
           <a:endParaRPr lang="en-US" dirty="0" smtClean="0"/>
         </a:p>
@@ -5597,7 +5624,7 @@
         </a:p>
       </dgm:t>
     </dgm:pt>
-    <dgm:pt modelId="{8B21CF4C-21A2-4750-ABE1-C772F52BAA35}">
+    <dgm:pt modelId="{B5B99486-6753-4F8A-888D-BCAE6F404477}">
       <dgm:prSet/>
       <dgm:spPr/>
       <dgm:t>
@@ -5606,13 +5633,29 @@
         <a:p>
           <a:r>
             <a:rPr lang="en-US" dirty="0" smtClean="0"/>
-            <a:t>Or the full set together in one go?</a:t>
+            <a:t>PCEP-LS, </a:t>
           </a:r>
-          <a:endParaRPr lang="en-US" dirty="0"/>
+          <a:r>
+            <a:rPr lang="en-US" dirty="0" err="1" smtClean="0"/>
+            <a:t>Stateful</a:t>
+          </a:r>
+          <a:r>
+            <a:rPr lang="en-US" dirty="0" smtClean="0"/>
+            <a:t> H-PCE, VN-Association </a:t>
+          </a:r>
+          <a:r>
+            <a:rPr lang="en-US" dirty="0" err="1" smtClean="0"/>
+            <a:t>etc</a:t>
+          </a:r>
+          <a:r>
+            <a:rPr lang="en-US" dirty="0" smtClean="0"/>
+            <a:t>  </a:t>
+          </a:r>
+          <a:endParaRPr lang="en-US" dirty="0" smtClean="0"/>
         </a:p>
       </dgm:t>
     </dgm:pt>
-    <dgm:pt modelId="{40D90178-642A-4CE5-8BDF-0940459A1D94}" type="parTrans" cxnId="{7AA9E066-0A5E-4BC5-BDBD-1D31E107773A}">
+    <dgm:pt modelId="{B905DD40-1C47-462E-9138-8F4F8DFE1A46}" type="parTrans" cxnId="{086BA129-B76D-42A6-B861-463B61604F75}">
       <dgm:prSet/>
       <dgm:spPr/>
       <dgm:t>
@@ -5623,7 +5666,7 @@
         </a:p>
       </dgm:t>
     </dgm:pt>
-    <dgm:pt modelId="{CB029E07-47B3-496E-AC23-9E2BC1766481}" type="sibTrans" cxnId="{7AA9E066-0A5E-4BC5-BDBD-1D31E107773A}">
+    <dgm:pt modelId="{F1436E89-B48B-4645-BE48-23C2D20DC7DA}" type="sibTrans" cxnId="{086BA129-B76D-42A6-B861-463B61604F75}">
       <dgm:prSet/>
       <dgm:spPr/>
       <dgm:t>
@@ -5642,6 +5685,13 @@
         </dgm:presLayoutVars>
       </dgm:prSet>
       <dgm:spPr/>
+      <dgm:t>
+        <a:bodyPr/>
+        <a:lstStyle/>
+        <a:p>
+          <a:endParaRPr lang="en-US"/>
+        </a:p>
+      </dgm:t>
     </dgm:pt>
     <dgm:pt modelId="{41033323-1DB6-49A2-9DE6-37D412F0B3D9}" type="pres">
       <dgm:prSet presAssocID="{409CC6DA-59AD-40D2-8C62-403CF57291B0}" presName="parentText" presStyleLbl="node1" presStyleIdx="0" presStyleCnt="3">
@@ -5651,6 +5701,13 @@
         </dgm:presLayoutVars>
       </dgm:prSet>
       <dgm:spPr/>
+      <dgm:t>
+        <a:bodyPr/>
+        <a:lstStyle/>
+        <a:p>
+          <a:endParaRPr lang="en-US"/>
+        </a:p>
+      </dgm:t>
     </dgm:pt>
     <dgm:pt modelId="{7E62950B-1E90-45B2-AD0F-73374DC9558F}" type="pres">
       <dgm:prSet presAssocID="{409CC6DA-59AD-40D2-8C62-403CF57291B0}" presName="childText" presStyleLbl="revTx" presStyleIdx="0" presStyleCnt="3">
@@ -5659,6 +5716,13 @@
         </dgm:presLayoutVars>
       </dgm:prSet>
       <dgm:spPr/>
+      <dgm:t>
+        <a:bodyPr/>
+        <a:lstStyle/>
+        <a:p>
+          <a:endParaRPr lang="en-US"/>
+        </a:p>
+      </dgm:t>
     </dgm:pt>
     <dgm:pt modelId="{1D678880-7385-450E-B295-36D024A2C865}" type="pres">
       <dgm:prSet presAssocID="{08A7FFCC-0D82-4F02-AEA7-0E7D4288C324}" presName="parentText" presStyleLbl="node1" presStyleIdx="1" presStyleCnt="3">
@@ -5668,6 +5732,13 @@
         </dgm:presLayoutVars>
       </dgm:prSet>
       <dgm:spPr/>
+      <dgm:t>
+        <a:bodyPr/>
+        <a:lstStyle/>
+        <a:p>
+          <a:endParaRPr lang="en-US"/>
+        </a:p>
+      </dgm:t>
     </dgm:pt>
     <dgm:pt modelId="{C2FEA527-F1B7-4D73-867E-9F24B9C80D9A}" type="pres">
       <dgm:prSet presAssocID="{08A7FFCC-0D82-4F02-AEA7-0E7D4288C324}" presName="childText" presStyleLbl="revTx" presStyleIdx="1" presStyleCnt="3">
@@ -5676,6 +5747,13 @@
         </dgm:presLayoutVars>
       </dgm:prSet>
       <dgm:spPr/>
+      <dgm:t>
+        <a:bodyPr/>
+        <a:lstStyle/>
+        <a:p>
+          <a:endParaRPr lang="en-US"/>
+        </a:p>
+      </dgm:t>
     </dgm:pt>
     <dgm:pt modelId="{F533728E-9E20-42E3-AEB0-EE6DA6D3EA33}" type="pres">
       <dgm:prSet presAssocID="{6939F185-2119-428F-8C0F-40280424D76A}" presName="parentText" presStyleLbl="node1" presStyleIdx="2" presStyleCnt="3">
@@ -5685,6 +5763,13 @@
         </dgm:presLayoutVars>
       </dgm:prSet>
       <dgm:spPr/>
+      <dgm:t>
+        <a:bodyPr/>
+        <a:lstStyle/>
+        <a:p>
+          <a:endParaRPr lang="en-US"/>
+        </a:p>
+      </dgm:t>
     </dgm:pt>
     <dgm:pt modelId="{B5C979CB-09EE-4530-8391-A80DF7394DF5}" type="pres">
       <dgm:prSet presAssocID="{6939F185-2119-428F-8C0F-40280424D76A}" presName="childText" presStyleLbl="revTx" presStyleIdx="2" presStyleCnt="3">
@@ -5693,24 +5778,31 @@
         </dgm:presLayoutVars>
       </dgm:prSet>
       <dgm:spPr/>
+      <dgm:t>
+        <a:bodyPr/>
+        <a:lstStyle/>
+        <a:p>
+          <a:endParaRPr lang="en-US"/>
+        </a:p>
+      </dgm:t>
     </dgm:pt>
   </dgm:ptLst>
   <dgm:cxnLst>
-    <dgm:cxn modelId="{7AA9E066-0A5E-4BC5-BDBD-1D31E107773A}" srcId="{6939F185-2119-428F-8C0F-40280424D76A}" destId="{8B21CF4C-21A2-4750-ABE1-C772F52BAA35}" srcOrd="1" destOrd="0" parTransId="{40D90178-642A-4CE5-8BDF-0940459A1D94}" sibTransId="{CB029E07-47B3-496E-AC23-9E2BC1766481}"/>
-    <dgm:cxn modelId="{371FD584-E448-46C2-9682-BEBF6A452C80}" type="presOf" srcId="{8B21CF4C-21A2-4750-ABE1-C772F52BAA35}" destId="{B5C979CB-09EE-4530-8391-A80DF7394DF5}" srcOrd="0" destOrd="1" presId="urn:microsoft.com/office/officeart/2005/8/layout/vList2"/>
-    <dgm:cxn modelId="{9A802AE9-EAEC-497A-9972-CFAE9152B6AD}" srcId="{409CC6DA-59AD-40D2-8C62-403CF57291B0}" destId="{072D8E52-2457-4565-917F-07638F218B96}" srcOrd="0" destOrd="0" parTransId="{59C0C0E1-076E-42EC-89E6-22661458C384}" sibTransId="{001179E0-133F-4F39-BD38-B2BC89E88C7B}"/>
     <dgm:cxn modelId="{01018CFC-2092-4A80-B8EA-70D5F5EB592E}" type="presOf" srcId="{6939F185-2119-428F-8C0F-40280424D76A}" destId="{F533728E-9E20-42E3-AEB0-EE6DA6D3EA33}" srcOrd="0" destOrd="0" presId="urn:microsoft.com/office/officeart/2005/8/layout/vList2"/>
+    <dgm:cxn modelId="{F2CC8A7A-67A0-4854-82C3-5E3FD66470D3}" type="presOf" srcId="{D78A852B-C8DC-4C9A-AD0D-FA2EE8BD4E48}" destId="{63EC38B1-53EB-4C9B-8BD3-09DF9A6C4EEE}" srcOrd="0" destOrd="0" presId="urn:microsoft.com/office/officeart/2005/8/layout/vList2"/>
     <dgm:cxn modelId="{C6C2768A-4E1E-4C30-B264-6FD022A4E031}" srcId="{D78A852B-C8DC-4C9A-AD0D-FA2EE8BD4E48}" destId="{409CC6DA-59AD-40D2-8C62-403CF57291B0}" srcOrd="0" destOrd="0" parTransId="{667F5F28-631C-4EC4-9EBA-5403EE733935}" sibTransId="{DE7F2078-487D-4618-A8C9-A1DC69B7EE94}"/>
-    <dgm:cxn modelId="{3CA0B873-7FF6-49C0-8B11-B59E6E9469EA}" type="presOf" srcId="{409CC6DA-59AD-40D2-8C62-403CF57291B0}" destId="{41033323-1DB6-49A2-9DE6-37D412F0B3D9}" srcOrd="0" destOrd="0" presId="urn:microsoft.com/office/officeart/2005/8/layout/vList2"/>
-    <dgm:cxn modelId="{474A222E-2D98-41C8-B515-F7289DA1F42F}" type="presOf" srcId="{08A7FFCC-0D82-4F02-AEA7-0E7D4288C324}" destId="{1D678880-7385-450E-B295-36D024A2C865}" srcOrd="0" destOrd="0" presId="urn:microsoft.com/office/officeart/2005/8/layout/vList2"/>
-    <dgm:cxn modelId="{D83E2A88-6826-4798-85A1-6A6DE66A6586}" type="presOf" srcId="{072D8E52-2457-4565-917F-07638F218B96}" destId="{7E62950B-1E90-45B2-AD0F-73374DC9558F}" srcOrd="0" destOrd="0" presId="urn:microsoft.com/office/officeart/2005/8/layout/vList2"/>
-    <dgm:cxn modelId="{F053D16B-E213-4E02-A607-4A45995B6EDE}" srcId="{D78A852B-C8DC-4C9A-AD0D-FA2EE8BD4E48}" destId="{6939F185-2119-428F-8C0F-40280424D76A}" srcOrd="2" destOrd="0" parTransId="{086FC887-3D64-41A0-A267-95DCBCF44ACE}" sibTransId="{BFD7FCE8-176A-4115-B5DE-C85A50F98204}"/>
-    <dgm:cxn modelId="{F2CC8A7A-67A0-4854-82C3-5E3FD66470D3}" type="presOf" srcId="{D78A852B-C8DC-4C9A-AD0D-FA2EE8BD4E48}" destId="{63EC38B1-53EB-4C9B-8BD3-09DF9A6C4EEE}" srcOrd="0" destOrd="0" presId="urn:microsoft.com/office/officeart/2005/8/layout/vList2"/>
     <dgm:cxn modelId="{B48EB6CD-495F-4F1B-ABB0-8EB87D4ED50D}" srcId="{D78A852B-C8DC-4C9A-AD0D-FA2EE8BD4E48}" destId="{08A7FFCC-0D82-4F02-AEA7-0E7D4288C324}" srcOrd="1" destOrd="0" parTransId="{D2050B2D-126A-4001-83AD-1046DBB66DE6}" sibTransId="{B3366275-3070-480C-8D2F-1BBF0DC25351}"/>
     <dgm:cxn modelId="{7FD3D8EB-C3EE-43FB-8070-30A46487534F}" srcId="{6939F185-2119-428F-8C0F-40280424D76A}" destId="{B43C761C-0C2C-4145-9A2E-4AE72BEA1742}" srcOrd="0" destOrd="0" parTransId="{0F13F53A-143D-4B79-88C5-638E99E9062E}" sibTransId="{275E0527-B955-4FE7-B316-614D6EE2A240}"/>
+    <dgm:cxn modelId="{9A802AE9-EAEC-497A-9972-CFAE9152B6AD}" srcId="{409CC6DA-59AD-40D2-8C62-403CF57291B0}" destId="{072D8E52-2457-4565-917F-07638F218B96}" srcOrd="0" destOrd="0" parTransId="{59C0C0E1-076E-42EC-89E6-22661458C384}" sibTransId="{001179E0-133F-4F39-BD38-B2BC89E88C7B}"/>
+    <dgm:cxn modelId="{086BA129-B76D-42A6-B861-463B61604F75}" srcId="{409CC6DA-59AD-40D2-8C62-403CF57291B0}" destId="{B5B99486-6753-4F8A-888D-BCAE6F404477}" srcOrd="1" destOrd="0" parTransId="{B905DD40-1C47-462E-9138-8F4F8DFE1A46}" sibTransId="{F1436E89-B48B-4645-BE48-23C2D20DC7DA}"/>
+    <dgm:cxn modelId="{810761D0-7F73-4167-A8EF-6971B2A64639}" type="presOf" srcId="{DF07CE90-C053-40F7-BC4C-F5028259EFCA}" destId="{C2FEA527-F1B7-4D73-867E-9F24B9C80D9A}" srcOrd="0" destOrd="0" presId="urn:microsoft.com/office/officeart/2005/8/layout/vList2"/>
+    <dgm:cxn modelId="{474A222E-2D98-41C8-B515-F7289DA1F42F}" type="presOf" srcId="{08A7FFCC-0D82-4F02-AEA7-0E7D4288C324}" destId="{1D678880-7385-450E-B295-36D024A2C865}" srcOrd="0" destOrd="0" presId="urn:microsoft.com/office/officeart/2005/8/layout/vList2"/>
+    <dgm:cxn modelId="{3CA0B873-7FF6-49C0-8B11-B59E6E9469EA}" type="presOf" srcId="{409CC6DA-59AD-40D2-8C62-403CF57291B0}" destId="{41033323-1DB6-49A2-9DE6-37D412F0B3D9}" srcOrd="0" destOrd="0" presId="urn:microsoft.com/office/officeart/2005/8/layout/vList2"/>
+    <dgm:cxn modelId="{F053D16B-E213-4E02-A607-4A45995B6EDE}" srcId="{D78A852B-C8DC-4C9A-AD0D-FA2EE8BD4E48}" destId="{6939F185-2119-428F-8C0F-40280424D76A}" srcOrd="2" destOrd="0" parTransId="{086FC887-3D64-41A0-A267-95DCBCF44ACE}" sibTransId="{BFD7FCE8-176A-4115-B5DE-C85A50F98204}"/>
+    <dgm:cxn modelId="{44A259F8-295A-4C7B-8815-17F653733C6F}" srcId="{08A7FFCC-0D82-4F02-AEA7-0E7D4288C324}" destId="{DF07CE90-C053-40F7-BC4C-F5028259EFCA}" srcOrd="0" destOrd="0" parTransId="{7332AB4E-7CC1-4BE9-9862-502D858052FD}" sibTransId="{6961426C-06EA-48D6-A022-DA089C2E2B00}"/>
+    <dgm:cxn modelId="{8729B50F-D0AF-41A8-B3B2-771FC3A4955D}" type="presOf" srcId="{B5B99486-6753-4F8A-888D-BCAE6F404477}" destId="{7E62950B-1E90-45B2-AD0F-73374DC9558F}" srcOrd="0" destOrd="1" presId="urn:microsoft.com/office/officeart/2005/8/layout/vList2"/>
+    <dgm:cxn modelId="{D83E2A88-6826-4798-85A1-6A6DE66A6586}" type="presOf" srcId="{072D8E52-2457-4565-917F-07638F218B96}" destId="{7E62950B-1E90-45B2-AD0F-73374DC9558F}" srcOrd="0" destOrd="0" presId="urn:microsoft.com/office/officeart/2005/8/layout/vList2"/>
     <dgm:cxn modelId="{E899738B-70CD-4825-B755-8F3C5FE4FD47}" type="presOf" srcId="{B43C761C-0C2C-4145-9A2E-4AE72BEA1742}" destId="{B5C979CB-09EE-4530-8391-A80DF7394DF5}" srcOrd="0" destOrd="0" presId="urn:microsoft.com/office/officeart/2005/8/layout/vList2"/>
-    <dgm:cxn modelId="{810761D0-7F73-4167-A8EF-6971B2A64639}" type="presOf" srcId="{DF07CE90-C053-40F7-BC4C-F5028259EFCA}" destId="{C2FEA527-F1B7-4D73-867E-9F24B9C80D9A}" srcOrd="0" destOrd="0" presId="urn:microsoft.com/office/officeart/2005/8/layout/vList2"/>
-    <dgm:cxn modelId="{44A259F8-295A-4C7B-8815-17F653733C6F}" srcId="{08A7FFCC-0D82-4F02-AEA7-0E7D4288C324}" destId="{DF07CE90-C053-40F7-BC4C-F5028259EFCA}" srcOrd="0" destOrd="0" parTransId="{7332AB4E-7CC1-4BE9-9862-502D858052FD}" sibTransId="{6961426C-06EA-48D6-A022-DA089C2E2B00}"/>
     <dgm:cxn modelId="{6260C704-82FF-4A1F-B8E7-5E7D4262A20E}" type="presParOf" srcId="{63EC38B1-53EB-4C9B-8BD3-09DF9A6C4EEE}" destId="{41033323-1DB6-49A2-9DE6-37D412F0B3D9}" srcOrd="0" destOrd="0" presId="urn:microsoft.com/office/officeart/2005/8/layout/vList2"/>
     <dgm:cxn modelId="{83D6FC86-C1DA-4358-9B9B-49AE34F70569}" type="presParOf" srcId="{63EC38B1-53EB-4C9B-8BD3-09DF9A6C4EEE}" destId="{7E62950B-1E90-45B2-AD0F-73374DC9558F}" srcOrd="1" destOrd="0" presId="urn:microsoft.com/office/officeart/2005/8/layout/vList2"/>
     <dgm:cxn modelId="{F7F9615A-65BD-4EF5-A5A3-4FF8C717B75A}" type="presParOf" srcId="{63EC38B1-53EB-4C9B-8BD3-09DF9A6C4EEE}" destId="{1D678880-7385-450E-B295-36D024A2C865}" srcOrd="2" destOrd="0" presId="urn:microsoft.com/office/officeart/2005/8/layout/vList2"/>
@@ -5803,19 +5895,7 @@
           </a:pPr>
           <a:r>
             <a:rPr lang="en-US" altLang="zh-CN" sz="1300" kern="1200" dirty="0" smtClean="0"/>
-            <a:t>MDSC oversees different domains and build an E2E </a:t>
-          </a:r>
-          <a:r>
-            <a:rPr lang="en-US" altLang="zh-CN" sz="1300" kern="1200" dirty="0" smtClean="0"/>
-            <a:t>abstracted topology </a:t>
-          </a:r>
-          <a:r>
-            <a:rPr lang="en-US" altLang="zh-CN" sz="1300" kern="1200" dirty="0" smtClean="0"/>
-            <a:t>and coordinate E2E </a:t>
-          </a:r>
-          <a:r>
-            <a:rPr lang="en-US" altLang="zh-CN" sz="1300" kern="1200" dirty="0" smtClean="0"/>
-            <a:t>path/service provisioning.</a:t>
+            <a:t>MDSC oversees different domains and build an E2E abstracted topology and coordinate E2E path/service provisioning.</a:t>
           </a:r>
           <a:endParaRPr lang="zh-CN" altLang="en-US" sz="1300" kern="1200" dirty="0"/>
         </a:p>
@@ -5969,23 +6049,7 @@
           </a:pPr>
           <a:r>
             <a:rPr lang="en-US" altLang="zh-CN" sz="1300" kern="1200" dirty="0" smtClean="0"/>
-            <a:t>An abstracted </a:t>
-          </a:r>
-          <a:r>
-            <a:rPr lang="en-US" altLang="zh-CN" sz="1300" kern="1200" dirty="0" smtClean="0"/>
-            <a:t>view of underlying network </a:t>
-          </a:r>
-          <a:r>
-            <a:rPr lang="en-US" altLang="zh-CN" sz="1300" kern="1200" dirty="0" smtClean="0"/>
-            <a:t>resources of </a:t>
-          </a:r>
-          <a:r>
-            <a:rPr lang="en-US" altLang="zh-CN" sz="1300" kern="1200" dirty="0" smtClean="0"/>
-            <a:t>each </a:t>
-          </a:r>
-          <a:r>
-            <a:rPr lang="en-US" altLang="zh-CN" sz="1300" kern="1200" dirty="0" smtClean="0"/>
-            <a:t>domain to form an E2E network topology.</a:t>
+            <a:t>An abstracted view of underlying network resources of each domain to form an E2E network topology.</a:t>
           </a:r>
           <a:endParaRPr lang="zh-CN" altLang="en-US" sz="1300" kern="1200" dirty="0"/>
         </a:p>
@@ -6004,11 +6068,7 @@
           </a:pPr>
           <a:r>
             <a:rPr lang="en-US" altLang="zh-CN" sz="1300" kern="1200" dirty="0" smtClean="0"/>
-            <a:t>Includes customer’s </a:t>
-          </a:r>
-          <a:r>
-            <a:rPr lang="en-US" altLang="zh-CN" sz="1300" kern="1200" dirty="0" smtClean="0"/>
-            <a:t>view of network slice</a:t>
+            <a:t>Includes customer’s view of network slice</a:t>
           </a:r>
           <a:endParaRPr lang="zh-CN" altLang="en-US" sz="1300" kern="1200" dirty="0"/>
         </a:p>
@@ -6162,11 +6222,7 @@
           </a:pPr>
           <a:r>
             <a:rPr lang="en-US" altLang="zh-CN" sz="1300" kern="1200" dirty="0" smtClean="0"/>
-            <a:t>Map customer VN requirements into network provisioning </a:t>
-          </a:r>
-          <a:r>
-            <a:rPr lang="en-US" altLang="zh-CN" sz="1300" kern="1200" dirty="0" smtClean="0"/>
-            <a:t>requests that are serviced by the PNC</a:t>
+            <a:t>Map customer VN requirements into network provisioning requests that are serviced by the PNC</a:t>
           </a:r>
           <a:endParaRPr lang="zh-CN" altLang="en-US" sz="1300" kern="1200" dirty="0"/>
         </a:p>
@@ -6243,11 +6299,7 @@
           </a:pPr>
           <a:r>
             <a:rPr lang="en-IN" altLang="en-US" sz="1300" kern="1200" dirty="0" smtClean="0"/>
-            <a:t>Customer </a:t>
-          </a:r>
-          <a:r>
-            <a:rPr lang="en-IN" altLang="en-US" sz="1300" kern="1200" dirty="0" smtClean="0"/>
-            <a:t>mapping/</a:t>
+            <a:t>Customer mapping/</a:t>
           </a:r>
           <a:r>
             <a:rPr lang="en-US" sz="1300" kern="1200" dirty="0" smtClean="0"/>
@@ -7848,7 +7900,7 @@
       <dsp:spPr>
         <a:xfrm>
           <a:off x="0" y="873651"/>
-          <a:ext cx="5587465" cy="331200"/>
+          <a:ext cx="5587465" cy="548550"/>
         </a:xfrm>
         <a:prstGeom prst="rect">
           <a:avLst/>
@@ -7891,14 +7943,53 @@
           </a:pPr>
           <a:r>
             <a:rPr lang="en-US" sz="1600" kern="1200" dirty="0" smtClean="0"/>
-            <a:t>Implementation reports for some, shared on the list.  </a:t>
+            <a:t>Implementation reports for some, shared on the list</a:t>
+          </a:r>
+          <a:r>
+            <a:rPr lang="en-US" sz="1600" kern="1200" dirty="0" smtClean="0"/>
+            <a:t>.</a:t>
+          </a:r>
+          <a:endParaRPr lang="en-US" sz="1600" kern="1200" dirty="0" smtClean="0"/>
+        </a:p>
+        <a:p>
+          <a:pPr marL="171450" lvl="1" indent="-171450" algn="l" defTabSz="711200">
+            <a:lnSpc>
+              <a:spcPct val="90000"/>
+            </a:lnSpc>
+            <a:spcBef>
+              <a:spcPct val="0"/>
+            </a:spcBef>
+            <a:spcAft>
+              <a:spcPct val="20000"/>
+            </a:spcAft>
+            <a:buChar char="••"/>
+          </a:pPr>
+          <a:r>
+            <a:rPr lang="en-US" sz="1600" kern="1200" dirty="0" smtClean="0"/>
+            <a:t>PCEP-LS, </a:t>
+          </a:r>
+          <a:r>
+            <a:rPr lang="en-US" sz="1600" kern="1200" dirty="0" err="1" smtClean="0"/>
+            <a:t>Stateful</a:t>
+          </a:r>
+          <a:r>
+            <a:rPr lang="en-US" sz="1600" kern="1200" dirty="0" smtClean="0"/>
+            <a:t> H-PCE, VN-Association </a:t>
+          </a:r>
+          <a:r>
+            <a:rPr lang="en-US" sz="1600" kern="1200" dirty="0" err="1" smtClean="0"/>
+            <a:t>etc</a:t>
+          </a:r>
+          <a:r>
+            <a:rPr lang="en-US" sz="1600" kern="1200" dirty="0" smtClean="0"/>
+            <a:t>  </a:t>
           </a:r>
           <a:endParaRPr lang="en-US" sz="1600" kern="1200" dirty="0" smtClean="0"/>
         </a:p>
       </dsp:txBody>
       <dsp:txXfrm>
         <a:off x="0" y="873651"/>
-        <a:ext cx="5587465" cy="331200"/>
+        <a:ext cx="5587465" cy="548550"/>
       </dsp:txXfrm>
     </dsp:sp>
     <dsp:sp modelId="{1D678880-7385-450E-B295-36D024A2C865}">
@@ -7908,7 +7999,7 @@
       </dsp:nvSpPr>
       <dsp:spPr>
         <a:xfrm>
-          <a:off x="0" y="1204851"/>
+          <a:off x="0" y="1422201"/>
           <a:ext cx="5587465" cy="795600"/>
         </a:xfrm>
         <a:prstGeom prst="roundRect">
@@ -7974,7 +8065,7 @@
         </a:p>
       </dsp:txBody>
       <dsp:txXfrm>
-        <a:off x="38838" y="1243689"/>
+        <a:off x="38838" y="1461039"/>
         <a:ext cx="5509789" cy="717924"/>
       </dsp:txXfrm>
     </dsp:sp>
@@ -7985,7 +8076,7 @@
       </dsp:nvSpPr>
       <dsp:spPr>
         <a:xfrm>
-          <a:off x="0" y="2000452"/>
+          <a:off x="0" y="2217802"/>
           <a:ext cx="5587465" cy="331200"/>
         </a:xfrm>
         <a:prstGeom prst="rect">
@@ -8035,7 +8126,7 @@
         </a:p>
       </dsp:txBody>
       <dsp:txXfrm>
-        <a:off x="0" y="2000452"/>
+        <a:off x="0" y="2217802"/>
         <a:ext cx="5587465" cy="331200"/>
       </dsp:txXfrm>
     </dsp:sp>
@@ -8046,7 +8137,7 @@
       </dsp:nvSpPr>
       <dsp:spPr>
         <a:xfrm>
-          <a:off x="0" y="2331652"/>
+          <a:off x="0" y="2549001"/>
           <a:ext cx="5587465" cy="795600"/>
         </a:xfrm>
         <a:prstGeom prst="roundRect">
@@ -8112,7 +8203,7 @@
         </a:p>
       </dsp:txBody>
       <dsp:txXfrm>
-        <a:off x="38838" y="2370490"/>
+        <a:off x="38838" y="2587839"/>
         <a:ext cx="5509789" cy="717924"/>
       </dsp:txXfrm>
     </dsp:sp>
@@ -8123,8 +8214,8 @@
       </dsp:nvSpPr>
       <dsp:spPr>
         <a:xfrm>
-          <a:off x="0" y="3127252"/>
-          <a:ext cx="5587465" cy="548550"/>
+          <a:off x="0" y="3344602"/>
+          <a:ext cx="5587465" cy="331200"/>
         </a:xfrm>
         <a:prstGeom prst="rect">
           <a:avLst/>
@@ -8171,29 +8262,10 @@
           </a:r>
           <a:endParaRPr lang="en-US" sz="1600" kern="1200" dirty="0"/>
         </a:p>
-        <a:p>
-          <a:pPr marL="171450" lvl="1" indent="-171450" algn="l" defTabSz="711200">
-            <a:lnSpc>
-              <a:spcPct val="90000"/>
-            </a:lnSpc>
-            <a:spcBef>
-              <a:spcPct val="0"/>
-            </a:spcBef>
-            <a:spcAft>
-              <a:spcPct val="20000"/>
-            </a:spcAft>
-            <a:buChar char="••"/>
-          </a:pPr>
-          <a:r>
-            <a:rPr lang="en-US" sz="1600" kern="1200" dirty="0" smtClean="0"/>
-            <a:t>Or the full set together in one go?</a:t>
-          </a:r>
-          <a:endParaRPr lang="en-US" sz="1600" kern="1200" dirty="0"/>
-        </a:p>
       </dsp:txBody>
       <dsp:txXfrm>
-        <a:off x="0" y="3127252"/>
-        <a:ext cx="5587465" cy="548550"/>
+        <a:off x="0" y="3344602"/>
+        <a:ext cx="5587465" cy="331200"/>
       </dsp:txXfrm>
     </dsp:sp>
   </dsp:spTree>
@@ -13335,7 +13407,7 @@
           <a:p>
             <a:fld id="{CF8C66D5-35F2-4B2B-B66A-28018F619124}" type="datetimeFigureOut">
               <a:rPr lang="en-US" smtClean="0"/>
-              <a:t>3/23/2017</a:t>
+              <a:t>3/24/2017</a:t>
             </a:fld>
             <a:endParaRPr lang="en-US"/>
           </a:p>
@@ -13500,7 +13572,7 @@
           <a:p>
             <a:fld id="{654B7E8A-1102-47A1-B1C3-36AE88809383}" type="datetimeFigureOut">
               <a:rPr lang="en-US" smtClean="0"/>
-              <a:t>3/23/2017</a:t>
+              <a:t>3/24/2017</a:t>
             </a:fld>
             <a:endParaRPr lang="en-US"/>
           </a:p>
@@ -14295,7 +14367,7 @@
           <a:p>
             <a:fld id="{3E620EA5-6E26-421E-9350-551E899851E3}" type="datetime1">
               <a:rPr lang="en-US" smtClean="0"/>
-              <a:t>3/23/2017</a:t>
+              <a:t>3/24/2017</a:t>
             </a:fld>
             <a:endParaRPr lang="en-US"/>
           </a:p>
@@ -14546,7 +14618,7 @@
           <a:p>
             <a:fld id="{44D04BD5-8436-499B-99CC-201855EB1B2E}" type="datetime1">
               <a:rPr lang="en-US" smtClean="0"/>
-              <a:t>3/23/2017</a:t>
+              <a:t>3/24/2017</a:t>
             </a:fld>
             <a:endParaRPr lang="en-US"/>
           </a:p>
@@ -14797,7 +14869,7 @@
           <a:p>
             <a:fld id="{B6689B28-18EE-4381-8112-02CBF0C5CF6A}" type="datetime1">
               <a:rPr lang="en-US" smtClean="0"/>
-              <a:t>3/23/2017</a:t>
+              <a:t>3/24/2017</a:t>
             </a:fld>
             <a:endParaRPr lang="en-US"/>
           </a:p>
@@ -15048,7 +15120,7 @@
           <a:p>
             <a:fld id="{A7AB21E0-000B-4480-811D-0EB1BA9BDA8F}" type="datetime1">
               <a:rPr lang="en-US" smtClean="0"/>
-              <a:t>3/23/2017</a:t>
+              <a:t>3/24/2017</a:t>
             </a:fld>
             <a:endParaRPr lang="en-US"/>
           </a:p>
@@ -15311,7 +15383,7 @@
           <a:p>
             <a:fld id="{4F658BCA-6577-4DF3-8058-3D1739DFCC0E}" type="datetime1">
               <a:rPr lang="en-US" smtClean="0"/>
-              <a:t>3/23/2017</a:t>
+              <a:t>3/24/2017</a:t>
             </a:fld>
             <a:endParaRPr lang="en-US"/>
           </a:p>
@@ -15678,7 +15750,7 @@
           <a:p>
             <a:fld id="{AEFB2B32-A3A4-4025-9960-44F228C614A0}" type="datetime1">
               <a:rPr lang="en-US" smtClean="0"/>
-              <a:t>3/23/2017</a:t>
+              <a:t>3/24/2017</a:t>
             </a:fld>
             <a:endParaRPr lang="en-US"/>
           </a:p>
@@ -16181,7 +16253,7 @@
           <a:p>
             <a:fld id="{18F225CB-8E6B-40CA-9408-A236E9A37B56}" type="datetime1">
               <a:rPr lang="en-US" smtClean="0"/>
-              <a:t>3/23/2017</a:t>
+              <a:t>3/24/2017</a:t>
             </a:fld>
             <a:endParaRPr lang="en-US"/>
           </a:p>
@@ -16372,7 +16444,7 @@
           <a:p>
             <a:fld id="{9586D94E-D460-4CA8-98B3-47972C02A9AB}" type="datetime1">
               <a:rPr lang="en-US" smtClean="0"/>
-              <a:t>3/23/2017</a:t>
+              <a:t>3/24/2017</a:t>
             </a:fld>
             <a:endParaRPr lang="en-US"/>
           </a:p>
@@ -16532,7 +16604,7 @@
           <a:p>
             <a:fld id="{500391E5-4D57-40AD-81EA-B8FFA020C382}" type="datetime1">
               <a:rPr lang="en-US" smtClean="0"/>
-              <a:t>3/23/2017</a:t>
+              <a:t>3/24/2017</a:t>
             </a:fld>
             <a:endParaRPr lang="en-US"/>
           </a:p>
@@ -16883,7 +16955,7 @@
           <a:p>
             <a:fld id="{ADDE15CC-6BD2-4CC7-A653-5019444BB8CD}" type="datetime1">
               <a:rPr lang="en-US" smtClean="0"/>
-              <a:t>3/23/2017</a:t>
+              <a:t>3/24/2017</a:t>
             </a:fld>
             <a:endParaRPr lang="en-US"/>
           </a:p>
@@ -17214,7 +17286,7 @@
           <a:p>
             <a:fld id="{967C0B9C-A5C1-46AB-9F81-3C27CA1B1FFB}" type="datetime1">
               <a:rPr lang="en-US" smtClean="0"/>
-              <a:t>3/23/2017</a:t>
+              <a:t>3/24/2017</a:t>
             </a:fld>
             <a:endParaRPr lang="en-US"/>
           </a:p>
@@ -17800,7 +17872,7 @@
           <a:p>
             <a:fld id="{39BDBA5E-264A-4BF2-8725-171DFAB72123}" type="datetime1">
               <a:rPr lang="en-US" smtClean="0"/>
-              <a:t>3/23/2017</a:t>
+              <a:t>3/24/2017</a:t>
             </a:fld>
             <a:endParaRPr lang="en-US"/>
           </a:p>
@@ -18712,7 +18784,7 @@
           <p:nvPr>
             <p:extLst>
               <p:ext uri="{D42A27DB-BD31-4B8C-83A1-F6EECF244321}">
-                <p14:modId xmlns:p14="http://schemas.microsoft.com/office/powerpoint/2010/main" val="3892988307"/>
+                <p14:modId xmlns:p14="http://schemas.microsoft.com/office/powerpoint/2010/main" val="2029838480"/>
               </p:ext>
             </p:extLst>
           </p:nvPr>

</xml_diff>